<commit_message>
rent buy split including sorting invalid data correctly
</commit_message>
<xml_diff>
--- a/documents/slide_deck.pptx
+++ b/documents/slide_deck.pptx
@@ -5,7 +5,7 @@
     <p:sldMasterId id="2147483648" r:id="rId1"/>
   </p:sldMasterIdLst>
   <p:notesMasterIdLst>
-    <p:notesMasterId r:id="rId8"/>
+    <p:notesMasterId r:id="rId9"/>
   </p:notesMasterIdLst>
   <p:sldIdLst>
     <p:sldId id="256" r:id="rId2"/>
@@ -13,7 +13,8 @@
     <p:sldId id="273" r:id="rId4"/>
     <p:sldId id="275" r:id="rId5"/>
     <p:sldId id="276" r:id="rId6"/>
-    <p:sldId id="272" r:id="rId7"/>
+    <p:sldId id="277" r:id="rId7"/>
+    <p:sldId id="272" r:id="rId8"/>
   </p:sldIdLst>
   <p:sldSz cx="12192000" cy="6858000"/>
   <p:notesSz cx="6858000" cy="9144000"/>
@@ -6161,6 +6162,345 @@
           <p:spPr>
             <a:xfrm>
               <a:off x="460713" y="332656"/>
+              <a:ext cx="974626" cy="553998"/>
+            </a:xfrm>
+            <a:prstGeom prst="rect">
+              <a:avLst/>
+            </a:prstGeom>
+            <a:noFill/>
+          </p:spPr>
+          <p:txBody>
+            <a:bodyPr wrap="none" lIns="0" tIns="0" rIns="0" bIns="0" rtlCol="0">
+              <a:spAutoFit/>
+            </a:bodyPr>
+            <a:lstStyle/>
+            <a:p>
+              <a:r>
+                <a:rPr lang="en-US" sz="3600" b="1" dirty="0">
+                  <a:latin typeface="Arial" panose="020B0604020202020204" pitchFamily="34" charset="0"/>
+                  <a:cs typeface="Arial" panose="020B0604020202020204" pitchFamily="34" charset="0"/>
+                </a:rPr>
+                <a:t>EDA</a:t>
+              </a:r>
+            </a:p>
+          </p:txBody>
+        </p:sp>
+        <p:cxnSp>
+          <p:nvCxnSpPr>
+            <p:cNvPr id="5" name="Straight Connector 4">
+              <a:extLst>
+                <a:ext uri="{FF2B5EF4-FFF2-40B4-BE49-F238E27FC236}">
+                  <a16:creationId xmlns:a16="http://schemas.microsoft.com/office/drawing/2014/main" id="{2C33E258-DEC9-CA46-B975-07B9968A3786}"/>
+                </a:ext>
+              </a:extLst>
+            </p:cNvPr>
+            <p:cNvCxnSpPr>
+              <a:cxnSpLocks/>
+            </p:cNvCxnSpPr>
+            <p:nvPr/>
+          </p:nvCxnSpPr>
+          <p:spPr>
+            <a:xfrm>
+              <a:off x="460714" y="886654"/>
+              <a:ext cx="11270573" cy="0"/>
+            </a:xfrm>
+            <a:prstGeom prst="line">
+              <a:avLst/>
+            </a:prstGeom>
+            <a:ln w="38100">
+              <a:solidFill>
+                <a:schemeClr val="tx1"/>
+              </a:solidFill>
+            </a:ln>
+          </p:spPr>
+          <p:style>
+            <a:lnRef idx="1">
+              <a:schemeClr val="accent1"/>
+            </a:lnRef>
+            <a:fillRef idx="0">
+              <a:schemeClr val="accent1"/>
+            </a:fillRef>
+            <a:effectRef idx="0">
+              <a:schemeClr val="accent1"/>
+            </a:effectRef>
+            <a:fontRef idx="minor">
+              <a:schemeClr val="tx1"/>
+            </a:fontRef>
+          </p:style>
+        </p:cxnSp>
+      </p:grpSp>
+      <p:pic>
+        <p:nvPicPr>
+          <p:cNvPr id="7" name="Picture 6">
+            <a:extLst>
+              <a:ext uri="{FF2B5EF4-FFF2-40B4-BE49-F238E27FC236}">
+                <a16:creationId xmlns:a16="http://schemas.microsoft.com/office/drawing/2014/main" id="{20B39513-B094-7B48-A294-AA94305C13F6}"/>
+              </a:ext>
+            </a:extLst>
+          </p:cNvPr>
+          <p:cNvPicPr>
+            <a:picLocks noChangeAspect="1"/>
+          </p:cNvPicPr>
+          <p:nvPr/>
+        </p:nvPicPr>
+        <p:blipFill>
+          <a:blip r:embed="rId2"/>
+          <a:stretch>
+            <a:fillRect/>
+          </a:stretch>
+        </p:blipFill>
+        <p:spPr>
+          <a:xfrm>
+            <a:off x="263352" y="2607496"/>
+            <a:ext cx="5544616" cy="2772308"/>
+          </a:xfrm>
+          <a:prstGeom prst="rect">
+            <a:avLst/>
+          </a:prstGeom>
+        </p:spPr>
+      </p:pic>
+      <p:grpSp>
+        <p:nvGrpSpPr>
+          <p:cNvPr id="9" name="Group 8">
+            <a:extLst>
+              <a:ext uri="{FF2B5EF4-FFF2-40B4-BE49-F238E27FC236}">
+                <a16:creationId xmlns:a16="http://schemas.microsoft.com/office/drawing/2014/main" id="{571E7D80-B840-1248-8795-D94E454F4315}"/>
+              </a:ext>
+            </a:extLst>
+          </p:cNvPr>
+          <p:cNvGrpSpPr/>
+          <p:nvPr/>
+        </p:nvGrpSpPr>
+        <p:grpSpPr>
+          <a:xfrm>
+            <a:off x="465285" y="1091721"/>
+            <a:ext cx="5209425" cy="373028"/>
+            <a:chOff x="443052" y="1217076"/>
+            <a:chExt cx="5209425" cy="373028"/>
+          </a:xfrm>
+        </p:grpSpPr>
+        <p:sp>
+          <p:nvSpPr>
+            <p:cNvPr id="10" name="TextBox 9">
+              <a:extLst>
+                <a:ext uri="{FF2B5EF4-FFF2-40B4-BE49-F238E27FC236}">
+                  <a16:creationId xmlns:a16="http://schemas.microsoft.com/office/drawing/2014/main" id="{5EFCA00B-07CE-2248-A299-D311C44EEB3B}"/>
+                </a:ext>
+              </a:extLst>
+            </p:cNvPr>
+            <p:cNvSpPr txBox="1"/>
+            <p:nvPr/>
+          </p:nvSpPr>
+          <p:spPr>
+            <a:xfrm>
+              <a:off x="443052" y="1217076"/>
+              <a:ext cx="2734723" cy="369332"/>
+            </a:xfrm>
+            <a:prstGeom prst="rect">
+              <a:avLst/>
+            </a:prstGeom>
+            <a:noFill/>
+          </p:spPr>
+          <p:txBody>
+            <a:bodyPr wrap="none" lIns="0" tIns="0" rIns="0" bIns="0" rtlCol="0">
+              <a:spAutoFit/>
+            </a:bodyPr>
+            <a:lstStyle/>
+            <a:p>
+              <a:pPr algn="l"/>
+              <a:r>
+                <a:rPr lang="en-US" sz="2400" b="1" dirty="0">
+                  <a:solidFill>
+                    <a:srgbClr val="03529B"/>
+                  </a:solidFill>
+                  <a:latin typeface="Arial" panose="020B0604020202020204" pitchFamily="34" charset="0"/>
+                  <a:cs typeface="Arial" panose="020B0604020202020204" pitchFamily="34" charset="0"/>
+                </a:rPr>
+                <a:t>Price Distributions</a:t>
+              </a:r>
+            </a:p>
+          </p:txBody>
+        </p:sp>
+        <p:cxnSp>
+          <p:nvCxnSpPr>
+            <p:cNvPr id="11" name="Straight Connector 10">
+              <a:extLst>
+                <a:ext uri="{FF2B5EF4-FFF2-40B4-BE49-F238E27FC236}">
+                  <a16:creationId xmlns:a16="http://schemas.microsoft.com/office/drawing/2014/main" id="{2A8729C5-C4AE-A240-8C24-C7AC25A0DDB1}"/>
+                </a:ext>
+              </a:extLst>
+            </p:cNvPr>
+            <p:cNvCxnSpPr>
+              <a:cxnSpLocks/>
+            </p:cNvCxnSpPr>
+            <p:nvPr/>
+          </p:nvCxnSpPr>
+          <p:spPr>
+            <a:xfrm>
+              <a:off x="443052" y="1590104"/>
+              <a:ext cx="5209425" cy="0"/>
+            </a:xfrm>
+            <a:prstGeom prst="line">
+              <a:avLst/>
+            </a:prstGeom>
+            <a:ln w="28575">
+              <a:solidFill>
+                <a:srgbClr val="03529B"/>
+              </a:solidFill>
+            </a:ln>
+          </p:spPr>
+          <p:style>
+            <a:lnRef idx="1">
+              <a:schemeClr val="accent1"/>
+            </a:lnRef>
+            <a:fillRef idx="0">
+              <a:schemeClr val="accent1"/>
+            </a:fillRef>
+            <a:effectRef idx="0">
+              <a:schemeClr val="accent1"/>
+            </a:effectRef>
+            <a:fontRef idx="minor">
+              <a:schemeClr val="tx1"/>
+            </a:fontRef>
+          </p:style>
+        </p:cxnSp>
+      </p:grpSp>
+      <p:sp>
+        <p:nvSpPr>
+          <p:cNvPr id="12" name="TextBox 11">
+            <a:extLst>
+              <a:ext uri="{FF2B5EF4-FFF2-40B4-BE49-F238E27FC236}">
+                <a16:creationId xmlns:a16="http://schemas.microsoft.com/office/drawing/2014/main" id="{280D4A56-E8DD-EC41-B11C-1732A1E0820A}"/>
+              </a:ext>
+            </a:extLst>
+          </p:cNvPr>
+          <p:cNvSpPr txBox="1"/>
+          <p:nvPr/>
+        </p:nvSpPr>
+        <p:spPr>
+          <a:xfrm>
+            <a:off x="527125" y="1688950"/>
+            <a:ext cx="5147585" cy="738664"/>
+          </a:xfrm>
+          <a:prstGeom prst="rect">
+            <a:avLst/>
+          </a:prstGeom>
+          <a:noFill/>
+        </p:spPr>
+        <p:txBody>
+          <a:bodyPr wrap="square" lIns="0" tIns="0" rIns="0" bIns="0" rtlCol="0">
+            <a:spAutoFit/>
+          </a:bodyPr>
+          <a:lstStyle/>
+          <a:p>
+            <a:pPr marL="342900" indent="-342900" algn="l">
+              <a:buFont typeface="Arial" panose="020B0604020202020204" pitchFamily="34" charset="0"/>
+              <a:buChar char="•"/>
+            </a:pPr>
+            <a:r>
+              <a:rPr lang="en-US" sz="2400" dirty="0">
+                <a:latin typeface="Arial" panose="020B0604020202020204" pitchFamily="34" charset="0"/>
+                <a:cs typeface="Arial" panose="020B0604020202020204" pitchFamily="34" charset="0"/>
+              </a:rPr>
+              <a:t>Even after data cleaning: skewed and contains 0s</a:t>
+            </a:r>
+          </a:p>
+        </p:txBody>
+      </p:sp>
+    </p:spTree>
+    <p:extLst>
+      <p:ext uri="{BB962C8B-B14F-4D97-AF65-F5344CB8AC3E}">
+        <p14:creationId xmlns:p14="http://schemas.microsoft.com/office/powerpoint/2010/main" val="1985438111"/>
+      </p:ext>
+    </p:extLst>
+  </p:cSld>
+  <p:clrMapOvr>
+    <a:masterClrMapping/>
+  </p:clrMapOvr>
+</p:sld>
+</file>
+
+<file path=ppt/slides/slide6.xml><?xml version="1.0" encoding="utf-8"?>
+<p:sld xmlns:a="http://schemas.openxmlformats.org/drawingml/2006/main" xmlns:r="http://schemas.openxmlformats.org/officeDocument/2006/relationships" xmlns:p="http://schemas.openxmlformats.org/presentationml/2006/main">
+  <p:cSld>
+    <p:spTree>
+      <p:nvGrpSpPr>
+        <p:cNvPr id="1" name=""/>
+        <p:cNvGrpSpPr/>
+        <p:nvPr/>
+      </p:nvGrpSpPr>
+      <p:grpSpPr>
+        <a:xfrm>
+          <a:off x="0" y="0"/>
+          <a:ext cx="0" cy="0"/>
+          <a:chOff x="0" y="0"/>
+          <a:chExt cx="0" cy="0"/>
+        </a:xfrm>
+      </p:grpSpPr>
+      <p:sp>
+        <p:nvSpPr>
+          <p:cNvPr id="2" name="Slide Number Placeholder 1">
+            <a:extLst>
+              <a:ext uri="{FF2B5EF4-FFF2-40B4-BE49-F238E27FC236}">
+                <a16:creationId xmlns:a16="http://schemas.microsoft.com/office/drawing/2014/main" id="{1833D3C8-F2AB-A14D-B100-87C0BF61F1B4}"/>
+              </a:ext>
+            </a:extLst>
+          </p:cNvPr>
+          <p:cNvSpPr>
+            <a:spLocks noGrp="1"/>
+          </p:cNvSpPr>
+          <p:nvPr>
+            <p:ph type="sldNum" sz="quarter" idx="12"/>
+          </p:nvPr>
+        </p:nvSpPr>
+        <p:spPr/>
+        <p:txBody>
+          <a:bodyPr/>
+          <a:lstStyle/>
+          <a:p>
+            <a:fld id="{2D00CA07-45C7-8142-9F4D-3A07AD48DFA1}" type="slidenum">
+              <a:rPr lang="en-US" smtClean="0"/>
+              <a:t>6</a:t>
+            </a:fld>
+            <a:endParaRPr lang="en-US"/>
+          </a:p>
+        </p:txBody>
+      </p:sp>
+      <p:grpSp>
+        <p:nvGrpSpPr>
+          <p:cNvPr id="3" name="Group 2">
+            <a:extLst>
+              <a:ext uri="{FF2B5EF4-FFF2-40B4-BE49-F238E27FC236}">
+                <a16:creationId xmlns:a16="http://schemas.microsoft.com/office/drawing/2014/main" id="{F42B4E15-6242-D541-9199-7FA44EE8F4D3}"/>
+              </a:ext>
+            </a:extLst>
+          </p:cNvPr>
+          <p:cNvGrpSpPr/>
+          <p:nvPr/>
+        </p:nvGrpSpPr>
+        <p:grpSpPr>
+          <a:xfrm>
+            <a:off x="460713" y="332656"/>
+            <a:ext cx="11270574" cy="553998"/>
+            <a:chOff x="460713" y="332656"/>
+            <a:chExt cx="11270574" cy="553998"/>
+          </a:xfrm>
+        </p:grpSpPr>
+        <p:sp>
+          <p:nvSpPr>
+            <p:cNvPr id="4" name="TextBox 3">
+              <a:extLst>
+                <a:ext uri="{FF2B5EF4-FFF2-40B4-BE49-F238E27FC236}">
+                  <a16:creationId xmlns:a16="http://schemas.microsoft.com/office/drawing/2014/main" id="{C1AA725D-499F-764F-9716-299E65AF1CDB}"/>
+                </a:ext>
+              </a:extLst>
+            </p:cNvPr>
+            <p:cNvSpPr txBox="1"/>
+            <p:nvPr/>
+          </p:nvSpPr>
+          <p:spPr>
+            <a:xfrm>
+              <a:off x="460713" y="332656"/>
               <a:ext cx="1667123" cy="553998"/>
             </a:xfrm>
             <a:prstGeom prst="rect">
@@ -6231,7 +6571,7 @@
     </p:spTree>
     <p:extLst>
       <p:ext uri="{BB962C8B-B14F-4D97-AF65-F5344CB8AC3E}">
-        <p14:creationId xmlns:p14="http://schemas.microsoft.com/office/powerpoint/2010/main" val="1985438111"/>
+        <p14:creationId xmlns:p14="http://schemas.microsoft.com/office/powerpoint/2010/main" val="2750980307"/>
       </p:ext>
     </p:extLst>
   </p:cSld>
@@ -6241,7 +6581,7 @@
 </p:sld>
 </file>
 
-<file path=ppt/slides/slide6.xml><?xml version="1.0" encoding="utf-8"?>
+<file path=ppt/slides/slide7.xml><?xml version="1.0" encoding="utf-8"?>
 <p:sld xmlns:a="http://schemas.openxmlformats.org/drawingml/2006/main" xmlns:r="http://schemas.openxmlformats.org/officeDocument/2006/relationships" xmlns:p="http://schemas.openxmlformats.org/presentationml/2006/main" show="0">
   <p:cSld>
     <p:spTree>
@@ -6281,7 +6621,7 @@
           <a:p>
             <a:fld id="{2D00CA07-45C7-8142-9F4D-3A07AD48DFA1}" type="slidenum">
               <a:rPr lang="en-US" smtClean="0"/>
-              <a:t>6</a:t>
+              <a:t>7</a:t>
             </a:fld>
             <a:endParaRPr lang="en-US"/>
           </a:p>
@@ -6368,6 +6708,112 @@
           </a:fontRef>
         </p:style>
       </p:cxnSp>
+      <p:grpSp>
+        <p:nvGrpSpPr>
+          <p:cNvPr id="7" name="Group 6">
+            <a:extLst>
+              <a:ext uri="{FF2B5EF4-FFF2-40B4-BE49-F238E27FC236}">
+                <a16:creationId xmlns:a16="http://schemas.microsoft.com/office/drawing/2014/main" id="{62FA20A8-1F90-4D4B-B443-CB088222C0FB}"/>
+              </a:ext>
+            </a:extLst>
+          </p:cNvPr>
+          <p:cNvGrpSpPr/>
+          <p:nvPr/>
+        </p:nvGrpSpPr>
+        <p:grpSpPr>
+          <a:xfrm>
+            <a:off x="443052" y="1217076"/>
+            <a:ext cx="5209425" cy="373028"/>
+            <a:chOff x="443052" y="1217076"/>
+            <a:chExt cx="5209425" cy="373028"/>
+          </a:xfrm>
+        </p:grpSpPr>
+        <p:sp>
+          <p:nvSpPr>
+            <p:cNvPr id="5" name="TextBox 4">
+              <a:extLst>
+                <a:ext uri="{FF2B5EF4-FFF2-40B4-BE49-F238E27FC236}">
+                  <a16:creationId xmlns:a16="http://schemas.microsoft.com/office/drawing/2014/main" id="{4867D2EF-ABA2-0745-8963-662DD57C2854}"/>
+                </a:ext>
+              </a:extLst>
+            </p:cNvPr>
+            <p:cNvSpPr txBox="1"/>
+            <p:nvPr/>
+          </p:nvSpPr>
+          <p:spPr>
+            <a:xfrm>
+              <a:off x="443052" y="1217076"/>
+              <a:ext cx="1489190" cy="369332"/>
+            </a:xfrm>
+            <a:prstGeom prst="rect">
+              <a:avLst/>
+            </a:prstGeom>
+            <a:noFill/>
+          </p:spPr>
+          <p:txBody>
+            <a:bodyPr wrap="none" lIns="0" tIns="0" rIns="0" bIns="0" rtlCol="0">
+              <a:spAutoFit/>
+            </a:bodyPr>
+            <a:lstStyle/>
+            <a:p>
+              <a:pPr algn="l"/>
+              <a:r>
+                <a:rPr lang="en-US" sz="2400" b="1" dirty="0">
+                  <a:solidFill>
+                    <a:srgbClr val="03529B"/>
+                  </a:solidFill>
+                  <a:latin typeface="Arial" panose="020B0604020202020204" pitchFamily="34" charset="0"/>
+                  <a:cs typeface="Arial" panose="020B0604020202020204" pitchFamily="34" charset="0"/>
+                </a:rPr>
+                <a:t>Univariate</a:t>
+              </a:r>
+            </a:p>
+          </p:txBody>
+        </p:sp>
+        <p:cxnSp>
+          <p:nvCxnSpPr>
+            <p:cNvPr id="6" name="Straight Connector 5">
+              <a:extLst>
+                <a:ext uri="{FF2B5EF4-FFF2-40B4-BE49-F238E27FC236}">
+                  <a16:creationId xmlns:a16="http://schemas.microsoft.com/office/drawing/2014/main" id="{E5600007-C5AE-0C43-AEF1-92291D85FCA6}"/>
+                </a:ext>
+              </a:extLst>
+            </p:cNvPr>
+            <p:cNvCxnSpPr>
+              <a:cxnSpLocks/>
+            </p:cNvCxnSpPr>
+            <p:nvPr/>
+          </p:nvCxnSpPr>
+          <p:spPr>
+            <a:xfrm>
+              <a:off x="443052" y="1590104"/>
+              <a:ext cx="5209425" cy="0"/>
+            </a:xfrm>
+            <a:prstGeom prst="line">
+              <a:avLst/>
+            </a:prstGeom>
+            <a:ln w="28575">
+              <a:solidFill>
+                <a:srgbClr val="03529B"/>
+              </a:solidFill>
+            </a:ln>
+          </p:spPr>
+          <p:style>
+            <a:lnRef idx="1">
+              <a:schemeClr val="accent1"/>
+            </a:lnRef>
+            <a:fillRef idx="0">
+              <a:schemeClr val="accent1"/>
+            </a:fillRef>
+            <a:effectRef idx="0">
+              <a:schemeClr val="accent1"/>
+            </a:effectRef>
+            <a:fontRef idx="minor">
+              <a:schemeClr val="tx1"/>
+            </a:fontRef>
+          </p:style>
+        </p:cxnSp>
+      </p:grpSp>
     </p:spTree>
     <p:extLst>
       <p:ext uri="{BB962C8B-B14F-4D97-AF65-F5344CB8AC3E}">

</xml_diff>